<commit_message>
Login Männchen und Überschrift als PNG hinterlegt
</commit_message>
<xml_diff>
--- a/FST17_M4_PosterHoch_T04_mitBilder Ready - DIN-A0.pptx
+++ b/FST17_M4_PosterHoch_T04_mitBilder Ready - DIN-A0.pptx
@@ -8056,7 +8056,7 @@
           <p:nvPr/>
         </p:nvPicPr>
         <p:blipFill>
-          <a:blip r:embed="rId4">
+          <a:blip r:embed="rId4" cstate="print">
             <a:extLst>
               <a:ext uri="{28A0092B-C50C-407E-A947-70E740481C1C}">
                 <a14:useLocalDpi xmlns:a14="http://schemas.microsoft.com/office/drawing/2010/main" val="0"/>
@@ -8069,8 +8069,8 @@
         </p:blipFill>
         <p:spPr>
           <a:xfrm>
-            <a:off x="7719538" y="314805"/>
-            <a:ext cx="14836139" cy="2433127"/>
+            <a:off x="7719537" y="321819"/>
+            <a:ext cx="14836139" cy="2419099"/>
           </a:xfrm>
           <a:prstGeom prst="rect">
             <a:avLst/>
@@ -9208,7 +9208,7 @@
                 <a14:useLocalDpi xmlns:a14="http://schemas.microsoft.com/office/drawing/2010/main" val="0"/>
               </a:ext>
               <a:ext uri="{96DAC541-7B7A-43D3-8B79-37D633B846F1}">
-                <asvg:svgBlip xmlns="" xmlns:asvg="http://schemas.microsoft.com/office/drawing/2016/SVG/main" r:embed="rId29"/>
+                <asvg:svgBlip xmlns:asvg="http://schemas.microsoft.com/office/drawing/2016/SVG/main" xmlns="" r:embed="rId29"/>
               </a:ext>
             </a:extLst>
           </a:blip>
@@ -9596,7 +9596,7 @@
           <p:nvPr/>
         </p:nvPicPr>
         <p:blipFill>
-          <a:blip r:embed="rId41">
+          <a:blip r:embed="rId41" cstate="print">
             <a:extLst>
               <a:ext uri="{28A0092B-C50C-407E-A947-70E740481C1C}">
                 <a14:useLocalDpi xmlns:a14="http://schemas.microsoft.com/office/drawing/2010/main" val="0"/>
@@ -9609,8 +9609,8 @@
         </p:blipFill>
         <p:spPr>
           <a:xfrm>
-            <a:off x="24916356" y="363747"/>
-            <a:ext cx="718327" cy="718327"/>
+            <a:off x="24945254" y="363747"/>
+            <a:ext cx="660530" cy="718327"/>
           </a:xfrm>
           <a:prstGeom prst="rect">
             <a:avLst/>
@@ -9763,7 +9763,7 @@
                 <a14:useLocalDpi xmlns:a14="http://schemas.microsoft.com/office/drawing/2010/main" val="0"/>
               </a:ext>
               <a:ext uri="{96DAC541-7B7A-43D3-8B79-37D633B846F1}">
-                <asvg:svgBlip xmlns="" xmlns:asvg="http://schemas.microsoft.com/office/drawing/2016/SVG/main" r:embed="rId46"/>
+                <asvg:svgBlip xmlns:asvg="http://schemas.microsoft.com/office/drawing/2016/SVG/main" xmlns="" r:embed="rId46"/>
               </a:ext>
             </a:extLst>
           </a:blip>
@@ -9791,6 +9791,13 @@
   <p:clrMapOvr>
     <a:masterClrMapping/>
   </p:clrMapOvr>
+  <p:timing>
+    <p:tnLst>
+      <p:par>
+        <p:cTn id="1" dur="indefinite" restart="never" nodeType="tmRoot"/>
+      </p:par>
+    </p:tnLst>
+  </p:timing>
 </p:sld>
 </file>
 

</xml_diff>